<commit_message>
cs final ( almost almost)
</commit_message>
<xml_diff>
--- a/Cheatsheet/MLExpResso-cheatsheet.pptx
+++ b/Cheatsheet/MLExpResso-cheatsheet.pptx
@@ -1564,7 +1564,7 @@
           </a:ln>
           <a:extLst>
             <a:ext uri="{C572A759-6A51-4108-AA02-DFA0A04FC94B}">
-              <ma14:wrappingTextBoxFlag xmlns="" xmlns:ma14="http://schemas.microsoft.com/office/mac/drawingml/2011/main" val="1"/>
+              <ma14:wrappingTextBoxFlag xmlns:ma14="http://schemas.microsoft.com/office/mac/drawingml/2011/main" xmlns="" val="1"/>
             </a:ext>
           </a:extLst>
         </p:spPr>
@@ -1607,7 +1607,7 @@
           </a:ln>
           <a:extLst>
             <a:ext uri="{C572A759-6A51-4108-AA02-DFA0A04FC94B}">
-              <ma14:wrappingTextBoxFlag xmlns="" xmlns:ma14="http://schemas.microsoft.com/office/mac/drawingml/2011/main" val="1"/>
+              <ma14:wrappingTextBoxFlag xmlns:ma14="http://schemas.microsoft.com/office/mac/drawingml/2011/main" xmlns="" val="1"/>
             </a:ext>
           </a:extLst>
         </p:spPr>
@@ -2154,7 +2154,7 @@
           </a:ln>
           <a:extLst>
             <a:ext uri="{C572A759-6A51-4108-AA02-DFA0A04FC94B}">
-              <ma14:wrappingTextBoxFlag xmlns:ma14="http://schemas.microsoft.com/office/mac/drawingml/2011/main" xmlns="" val="1"/>
+              <ma14:wrappingTextBoxFlag xmlns="" xmlns:ma14="http://schemas.microsoft.com/office/mac/drawingml/2011/main" val="1"/>
             </a:ext>
           </a:extLst>
         </p:spPr>
@@ -2435,7 +2435,7 @@
           </a:ln>
           <a:extLst>
             <a:ext uri="{C572A759-6A51-4108-AA02-DFA0A04FC94B}">
-              <ma14:wrappingTextBoxFlag xmlns:ma14="http://schemas.microsoft.com/office/mac/drawingml/2011/main" xmlns="" val="1"/>
+              <ma14:wrappingTextBoxFlag xmlns="" xmlns:ma14="http://schemas.microsoft.com/office/mac/drawingml/2011/main" val="1"/>
             </a:ext>
           </a:extLst>
         </p:spPr>
@@ -2577,7 +2577,7 @@
           </a:ln>
           <a:extLst>
             <a:ext uri="{C572A759-6A51-4108-AA02-DFA0A04FC94B}">
-              <ma14:wrappingTextBoxFlag xmlns:ma14="http://schemas.microsoft.com/office/mac/drawingml/2011/main" xmlns="" val="1"/>
+              <ma14:wrappingTextBoxFlag xmlns="" xmlns:ma14="http://schemas.microsoft.com/office/mac/drawingml/2011/main" val="1"/>
             </a:ext>
           </a:extLst>
         </p:spPr>
@@ -2647,7 +2647,7 @@
           </a:ln>
           <a:extLst>
             <a:ext uri="{C572A759-6A51-4108-AA02-DFA0A04FC94B}">
-              <ma14:wrappingTextBoxFlag xmlns:ma14="http://schemas.microsoft.com/office/mac/drawingml/2011/main" xmlns="" val="1"/>
+              <ma14:wrappingTextBoxFlag xmlns="" xmlns:ma14="http://schemas.microsoft.com/office/mac/drawingml/2011/main" val="1"/>
             </a:ext>
           </a:extLst>
         </p:spPr>
@@ -2706,7 +2706,7 @@
           </a:ln>
           <a:extLst>
             <a:ext uri="{C572A759-6A51-4108-AA02-DFA0A04FC94B}">
-              <ma14:wrappingTextBoxFlag xmlns:ma14="http://schemas.microsoft.com/office/mac/drawingml/2011/main" xmlns="" val="1"/>
+              <ma14:wrappingTextBoxFlag xmlns="" xmlns:ma14="http://schemas.microsoft.com/office/mac/drawingml/2011/main" val="1"/>
             </a:ext>
           </a:extLst>
         </p:spPr>
@@ -2795,7 +2795,7 @@
           </a:ln>
           <a:extLst>
             <a:ext uri="{C572A759-6A51-4108-AA02-DFA0A04FC94B}">
-              <ma14:wrappingTextBoxFlag xmlns:ma14="http://schemas.microsoft.com/office/mac/drawingml/2011/main" xmlns="" val="1"/>
+              <ma14:wrappingTextBoxFlag xmlns="" xmlns:ma14="http://schemas.microsoft.com/office/mac/drawingml/2011/main" val="1"/>
             </a:ext>
           </a:extLst>
         </p:spPr>
@@ -2855,7 +2855,7 @@
           </a:ln>
           <a:extLst>
             <a:ext uri="{C572A759-6A51-4108-AA02-DFA0A04FC94B}">
-              <ma14:wrappingTextBoxFlag xmlns:ma14="http://schemas.microsoft.com/office/mac/drawingml/2011/main" xmlns="" val="1"/>
+              <ma14:wrappingTextBoxFlag xmlns="" xmlns:ma14="http://schemas.microsoft.com/office/mac/drawingml/2011/main" val="1"/>
             </a:ext>
           </a:extLst>
         </p:spPr>
@@ -2872,13 +2872,22 @@
               <a:defRPr sz="1800"/>
             </a:pPr>
             <a:r>
+              <a:rPr lang="pl-PL" sz="1200" dirty="0" err="1" smtClean="0">
+                <a:latin typeface="Menlo"/>
+                <a:ea typeface="Menlo"/>
+                <a:cs typeface="Menlo"/>
+                <a:sym typeface="Menlo"/>
+              </a:rPr>
+              <a:t>library</a:t>
+            </a:r>
+            <a:r>
               <a:rPr lang="pl-PL" sz="1200" dirty="0" smtClean="0">
                 <a:latin typeface="Menlo"/>
                 <a:ea typeface="Menlo"/>
                 <a:cs typeface="Menlo"/>
                 <a:sym typeface="Menlo"/>
               </a:rPr>
-              <a:t> </a:t>
+              <a:t>(</a:t>
             </a:r>
             <a:r>
               <a:rPr lang="pl-PL" sz="1200" dirty="0" err="1" smtClean="0">
@@ -2887,34 +2896,16 @@
                 <a:cs typeface="Menlo"/>
                 <a:sym typeface="Menlo"/>
               </a:rPr>
-              <a:t>library</a:t>
-            </a:r>
-            <a:r>
-              <a:rPr lang="pl-PL" sz="1200" dirty="0" smtClean="0">
-                <a:latin typeface="Menlo"/>
-                <a:ea typeface="Menlo"/>
-                <a:cs typeface="Menlo"/>
-                <a:sym typeface="Menlo"/>
-              </a:rPr>
-              <a:t>(</a:t>
-            </a:r>
-            <a:r>
-              <a:rPr lang="pl-PL" sz="1200" dirty="0" err="1" smtClean="0">
-                <a:latin typeface="Menlo"/>
-                <a:ea typeface="Menlo"/>
-                <a:cs typeface="Menlo"/>
-                <a:sym typeface="Menlo"/>
-              </a:rPr>
               <a:t>MLExpResso</a:t>
             </a:r>
             <a:r>
-              <a:rPr lang="pl-PL" sz="1200" dirty="0" smtClean="0">
-                <a:latin typeface="Menlo"/>
-                <a:ea typeface="Menlo"/>
-                <a:cs typeface="Menlo"/>
-                <a:sym typeface="Menlo"/>
-              </a:rPr>
-              <a:t> </a:t>
+              <a:rPr lang="pl-PL" sz="1200" dirty="0">
+                <a:latin typeface="Menlo"/>
+                <a:ea typeface="Menlo"/>
+                <a:cs typeface="Menlo"/>
+                <a:sym typeface="Menlo"/>
+              </a:rPr>
+              <a:t>)</a:t>
             </a:r>
           </a:p>
           <a:p>
@@ -2925,16 +2916,7 @@
               <a:defRPr sz="1800"/>
             </a:pPr>
             <a:r>
-              <a:rPr lang="pl-PL" sz="1200" dirty="0" smtClean="0">
-                <a:latin typeface="Menlo"/>
-                <a:ea typeface="Menlo"/>
-                <a:cs typeface="Menlo"/>
-                <a:sym typeface="Menlo"/>
-              </a:rPr>
-              <a:t> </a:t>
-            </a:r>
-            <a:r>
-              <a:rPr lang="pl-PL" sz="1200" dirty="0" err="1" smtClean="0">
+              <a:rPr lang="pl-PL" sz="1200" dirty="0" err="1">
                 <a:latin typeface="Menlo"/>
                 <a:ea typeface="Menlo"/>
                 <a:cs typeface="Menlo"/>
@@ -2943,7 +2925,7 @@
               <a:t>library</a:t>
             </a:r>
             <a:r>
-              <a:rPr lang="pl-PL" sz="1200" dirty="0" smtClean="0">
+              <a:rPr lang="pl-PL" sz="1200" dirty="0">
                 <a:latin typeface="Menlo"/>
                 <a:ea typeface="Menlo"/>
                 <a:cs typeface="Menlo"/>
@@ -2952,7 +2934,7 @@
               <a:t>(</a:t>
             </a:r>
             <a:r>
-              <a:rPr lang="pl-PL" sz="1200" dirty="0" err="1" smtClean="0">
+              <a:rPr lang="pl-PL" sz="1200" dirty="0" err="1">
                 <a:latin typeface="Menlo"/>
                 <a:ea typeface="Menlo"/>
                 <a:cs typeface="Menlo"/>
@@ -2961,7 +2943,7 @@
               <a:t>MLExpRessodata</a:t>
             </a:r>
             <a:r>
-              <a:rPr lang="pl-PL" sz="1200" dirty="0" smtClean="0">
+              <a:rPr lang="pl-PL" sz="1200" dirty="0">
                 <a:latin typeface="Menlo"/>
                 <a:ea typeface="Menlo"/>
                 <a:cs typeface="Menlo"/>
@@ -2978,16 +2960,7 @@
               <a:defRPr sz="1800"/>
             </a:pPr>
             <a:r>
-              <a:rPr lang="pl-PL" sz="1200" dirty="0" smtClean="0">
-                <a:latin typeface="Menlo"/>
-                <a:ea typeface="Menlo"/>
-                <a:cs typeface="Menlo"/>
-                <a:sym typeface="Menlo"/>
-              </a:rPr>
-              <a:t> </a:t>
-            </a:r>
-            <a:r>
-              <a:rPr lang="pl-PL" sz="1200" dirty="0" err="1" smtClean="0">
+              <a:rPr lang="pl-PL" sz="1200" dirty="0" err="1">
                 <a:latin typeface="Menlo"/>
                 <a:ea typeface="Menlo"/>
                 <a:cs typeface="Menlo"/>
@@ -2996,7 +2969,7 @@
               <a:t>exp</a:t>
             </a:r>
             <a:r>
-              <a:rPr lang="pl-PL" sz="1200" dirty="0" smtClean="0">
+              <a:rPr lang="pl-PL" sz="1200" dirty="0">
                 <a:latin typeface="Menlo"/>
                 <a:ea typeface="Menlo"/>
                 <a:cs typeface="Menlo"/>
@@ -3013,16 +2986,7 @@
               <a:defRPr sz="1800"/>
             </a:pPr>
             <a:r>
-              <a:rPr lang="pl-PL" sz="1200" dirty="0" smtClean="0">
-                <a:latin typeface="Menlo"/>
-                <a:ea typeface="Menlo"/>
-                <a:cs typeface="Menlo"/>
-                <a:sym typeface="Menlo"/>
-              </a:rPr>
-              <a:t> </a:t>
-            </a:r>
-            <a:r>
-              <a:rPr lang="pl-PL" sz="1200" dirty="0" err="1" smtClean="0">
+              <a:rPr lang="pl-PL" sz="1200" dirty="0" err="1">
                 <a:latin typeface="Menlo"/>
                 <a:ea typeface="Menlo"/>
                 <a:cs typeface="Menlo"/>
@@ -3031,31 +2995,13 @@
               <a:t>gr_exp</a:t>
             </a:r>
             <a:r>
-              <a:rPr lang="pl-PL" sz="1200" dirty="0" smtClean="0">
-                <a:latin typeface="Menlo"/>
-                <a:ea typeface="Menlo"/>
-                <a:cs typeface="Menlo"/>
-                <a:sym typeface="Menlo"/>
-              </a:rPr>
-              <a:t> &lt;- </a:t>
-            </a:r>
-            <a:r>
               <a:rPr lang="pl-PL" sz="1200" dirty="0">
                 <a:latin typeface="Menlo"/>
                 <a:ea typeface="Menlo"/>
                 <a:cs typeface="Menlo"/>
                 <a:sym typeface="Menlo"/>
               </a:rPr>
-              <a:t>BRCA_mRNAseq_chr17[ ,-1</a:t>
-            </a:r>
-            <a:r>
-              <a:rPr lang="pl-PL" sz="1200" dirty="0" smtClean="0">
-                <a:latin typeface="Menlo"/>
-                <a:ea typeface="Menlo"/>
-                <a:cs typeface="Menlo"/>
-                <a:sym typeface="Menlo"/>
-              </a:rPr>
-              <a:t>]</a:t>
+              <a:t> &lt;- BRCA_mRNAseq_chr17[ ,1]</a:t>
             </a:r>
           </a:p>
           <a:p>
@@ -3066,16 +3012,7 @@
               <a:defRPr sz="1800"/>
             </a:pPr>
             <a:r>
-              <a:rPr lang="pl-PL" sz="1200" dirty="0" smtClean="0">
-                <a:latin typeface="Menlo"/>
-                <a:ea typeface="Menlo"/>
-                <a:cs typeface="Menlo"/>
-                <a:sym typeface="Menlo"/>
-              </a:rPr>
-              <a:t> </a:t>
-            </a:r>
-            <a:r>
-              <a:rPr lang="pl-PL" sz="1200" dirty="0" err="1" smtClean="0">
+              <a:rPr lang="pl-PL" sz="1200" dirty="0" err="1">
                 <a:latin typeface="Menlo"/>
                 <a:ea typeface="Menlo"/>
                 <a:cs typeface="Menlo"/>
@@ -3084,7 +3021,7 @@
               <a:t>gr_exp</a:t>
             </a:r>
             <a:r>
-              <a:rPr lang="pl-PL" sz="1200" dirty="0" smtClean="0">
+              <a:rPr lang="pl-PL" sz="1200" dirty="0">
                 <a:latin typeface="Menlo"/>
                 <a:ea typeface="Menlo"/>
                 <a:cs typeface="Menlo"/>
@@ -3093,7 +3030,7 @@
               <a:t> &lt;- </a:t>
             </a:r>
             <a:r>
-              <a:rPr lang="pl-PL" sz="1200" dirty="0" err="1" smtClean="0">
+              <a:rPr lang="pl-PL" sz="1200" dirty="0" err="1">
                 <a:latin typeface="Menlo"/>
                 <a:ea typeface="Menlo"/>
                 <a:cs typeface="Menlo"/>
@@ -3102,7 +3039,7 @@
               <a:t>ifelse</a:t>
             </a:r>
             <a:r>
-              <a:rPr lang="pl-PL" sz="1200" dirty="0" smtClean="0">
+              <a:rPr lang="pl-PL" sz="1200" dirty="0">
                 <a:latin typeface="Menlo"/>
                 <a:ea typeface="Menlo"/>
                 <a:cs typeface="Menlo"/>
@@ -3111,16 +3048,16 @@
               <a:t>(</a:t>
             </a:r>
             <a:r>
-              <a:rPr lang="pl-PL" sz="1200" dirty="0" err="1" smtClean="0">
-                <a:latin typeface="Menlo"/>
-                <a:ea typeface="Menlo"/>
-                <a:cs typeface="Menlo"/>
-                <a:sym typeface="Menlo"/>
-              </a:rPr>
-              <a:t>group</a:t>
-            </a:r>
-            <a:r>
-              <a:rPr lang="pl-PL" sz="1200" dirty="0" smtClean="0">
+              <a:rPr lang="pl-PL" sz="1200" dirty="0" err="1">
+                <a:latin typeface="Menlo"/>
+                <a:ea typeface="Menlo"/>
+                <a:cs typeface="Menlo"/>
+                <a:sym typeface="Menlo"/>
+              </a:rPr>
+              <a:t>gr_exp</a:t>
+            </a:r>
+            <a:r>
+              <a:rPr lang="pl-PL" sz="1200" dirty="0">
                 <a:latin typeface="Menlo"/>
                 <a:ea typeface="Menlo"/>
                 <a:cs typeface="Menlo"/>
@@ -3129,7 +3066,7 @@
               <a:t>=='</a:t>
             </a:r>
             <a:r>
-              <a:rPr lang="pl-PL" sz="1200" dirty="0" err="1" smtClean="0">
+              <a:rPr lang="pl-PL" sz="1200" dirty="0" err="1">
                 <a:latin typeface="Menlo"/>
                 <a:ea typeface="Menlo"/>
                 <a:cs typeface="Menlo"/>
@@ -3144,19 +3081,10 @@
                 <a:cs typeface="Menlo"/>
                 <a:sym typeface="Menlo"/>
               </a:rPr>
-              <a:t>'</a:t>
-            </a:r>
-            <a:r>
-              <a:rPr lang="pl-PL" sz="1200" dirty="0" smtClean="0">
-                <a:latin typeface="Menlo"/>
-                <a:ea typeface="Menlo"/>
-                <a:cs typeface="Menlo"/>
-                <a:sym typeface="Menlo"/>
-              </a:rPr>
-              <a:t>, '</a:t>
-            </a:r>
-            <a:r>
-              <a:rPr lang="pl-PL" sz="1200" dirty="0" err="1" smtClean="0">
+              <a:t>', '</a:t>
+            </a:r>
+            <a:r>
+              <a:rPr lang="pl-PL" sz="1200" dirty="0" err="1">
                 <a:latin typeface="Menlo"/>
                 <a:ea typeface="Menlo"/>
                 <a:cs typeface="Menlo"/>
@@ -3171,19 +3099,10 @@
                 <a:cs typeface="Menlo"/>
                 <a:sym typeface="Menlo"/>
               </a:rPr>
-              <a:t>'</a:t>
-            </a:r>
-            <a:r>
-              <a:rPr lang="pl-PL" sz="1200" dirty="0" smtClean="0">
-                <a:latin typeface="Menlo"/>
-                <a:ea typeface="Menlo"/>
-                <a:cs typeface="Menlo"/>
-                <a:sym typeface="Menlo"/>
-              </a:rPr>
-              <a:t>, '</a:t>
-            </a:r>
-            <a:r>
-              <a:rPr lang="pl-PL" sz="1200" dirty="0" err="1" smtClean="0">
+              <a:t>', '</a:t>
+            </a:r>
+            <a:r>
+              <a:rPr lang="pl-PL" sz="1200" dirty="0" err="1">
                 <a:latin typeface="Menlo"/>
                 <a:ea typeface="Menlo"/>
                 <a:cs typeface="Menlo"/>
@@ -3192,7 +3111,7 @@
               <a:t>other</a:t>
             </a:r>
             <a:r>
-              <a:rPr lang="pl-PL" sz="1200" dirty="0" smtClean="0">
+              <a:rPr lang="pl-PL" sz="1200" dirty="0">
                 <a:latin typeface="Menlo"/>
                 <a:ea typeface="Menlo"/>
                 <a:cs typeface="Menlo"/>
@@ -3202,23 +3121,14 @@
             </a:r>
           </a:p>
           <a:p>
-            <a:pPr algn="l">
+            <a:pPr lvl="0" algn="l">
               <a:lnSpc>
                 <a:spcPct val="120000"/>
               </a:lnSpc>
               <a:defRPr sz="1800"/>
             </a:pPr>
             <a:r>
-              <a:rPr lang="pl-PL" sz="1200" dirty="0" smtClean="0">
-                <a:latin typeface="Menlo"/>
-                <a:ea typeface="Menlo"/>
-                <a:cs typeface="Menlo"/>
-                <a:sym typeface="Menlo"/>
-              </a:rPr>
-              <a:t> </a:t>
-            </a:r>
-            <a:r>
-              <a:rPr lang="pl-PL" sz="1200" dirty="0" err="1" smtClean="0">
+              <a:rPr lang="pl-PL" sz="1200" dirty="0" err="1">
                 <a:latin typeface="Menlo"/>
                 <a:ea typeface="Menlo"/>
                 <a:cs typeface="Menlo"/>
@@ -3227,7 +3137,7 @@
               <a:t>res_exp</a:t>
             </a:r>
             <a:r>
-              <a:rPr lang="pl-PL" sz="1200" dirty="0" smtClean="0">
+              <a:rPr lang="pl-PL" sz="1200" dirty="0">
                 <a:latin typeface="Menlo"/>
                 <a:ea typeface="Menlo"/>
                 <a:cs typeface="Menlo"/>
@@ -3236,7 +3146,7 @@
               <a:t> &lt;- </a:t>
             </a:r>
             <a:r>
-              <a:rPr lang="pl-PL" sz="1200" dirty="0" err="1" smtClean="0">
+              <a:rPr lang="pl-PL" sz="1200" dirty="0" err="1">
                 <a:latin typeface="Menlo"/>
                 <a:ea typeface="Menlo"/>
                 <a:cs typeface="Menlo"/>
@@ -3245,7 +3155,7 @@
               <a:t>calculate_test</a:t>
             </a:r>
             <a:r>
-              <a:rPr lang="pl-PL" sz="1200" dirty="0" smtClean="0">
+              <a:rPr lang="pl-PL" sz="1200" dirty="0">
                 <a:latin typeface="Menlo"/>
                 <a:ea typeface="Menlo"/>
                 <a:cs typeface="Menlo"/>
@@ -3254,7 +3164,7 @@
               <a:t>(</a:t>
             </a:r>
             <a:r>
-              <a:rPr lang="pl-PL" sz="1200" dirty="0" err="1" smtClean="0">
+              <a:rPr lang="pl-PL" sz="1200" dirty="0" err="1">
                 <a:latin typeface="Menlo"/>
                 <a:ea typeface="Menlo"/>
                 <a:cs typeface="Menlo"/>
@@ -3263,7 +3173,7 @@
               <a:t>exp</a:t>
             </a:r>
             <a:r>
-              <a:rPr lang="pl-PL" sz="1200" dirty="0" smtClean="0">
+              <a:rPr lang="pl-PL" sz="1200" dirty="0">
                 <a:latin typeface="Menlo"/>
                 <a:ea typeface="Menlo"/>
                 <a:cs typeface="Menlo"/>
@@ -3272,7 +3182,7 @@
               <a:t>, </a:t>
             </a:r>
             <a:r>
-              <a:rPr lang="pl-PL" sz="1200" dirty="0" err="1" smtClean="0">
+              <a:rPr lang="pl-PL" sz="1200" dirty="0" err="1">
                 <a:latin typeface="Menlo"/>
                 <a:ea typeface="Menlo"/>
                 <a:cs typeface="Menlo"/>
@@ -3281,7 +3191,7 @@
               <a:t>gr_exp</a:t>
             </a:r>
             <a:r>
-              <a:rPr lang="pl-PL" sz="1200" dirty="0" smtClean="0">
+              <a:rPr lang="pl-PL" sz="1200" dirty="0">
                 <a:latin typeface="Menlo"/>
                 <a:ea typeface="Menlo"/>
                 <a:cs typeface="Menlo"/>
@@ -3290,7 +3200,7 @@
               <a:t>, '</a:t>
             </a:r>
             <a:r>
-              <a:rPr lang="pl-PL" sz="1200" dirty="0" err="1" smtClean="0">
+              <a:rPr lang="pl-PL" sz="1200" dirty="0" err="1">
                 <a:latin typeface="Menlo"/>
                 <a:ea typeface="Menlo"/>
                 <a:cs typeface="Menlo"/>
@@ -3299,7 +3209,7 @@
               <a:t>lrt</a:t>
             </a:r>
             <a:r>
-              <a:rPr lang="pl-PL" sz="1200" dirty="0" smtClean="0">
+              <a:rPr lang="pl-PL" sz="1200" dirty="0">
                 <a:latin typeface="Menlo"/>
                 <a:ea typeface="Menlo"/>
                 <a:cs typeface="Menlo"/>
@@ -3335,7 +3245,7 @@
           </a:ln>
           <a:extLst>
             <a:ext uri="{C572A759-6A51-4108-AA02-DFA0A04FC94B}">
-              <ma14:wrappingTextBoxFlag xmlns:ma14="http://schemas.microsoft.com/office/mac/drawingml/2011/main" xmlns="" val="1"/>
+              <ma14:wrappingTextBoxFlag xmlns="" xmlns:ma14="http://schemas.microsoft.com/office/mac/drawingml/2011/main" val="1"/>
             </a:ext>
           </a:extLst>
         </p:spPr>
@@ -3442,7 +3352,7 @@
           </a:ln>
           <a:extLst>
             <a:ext uri="{C572A759-6A51-4108-AA02-DFA0A04FC94B}">
-              <ma14:wrappingTextBoxFlag xmlns:ma14="http://schemas.microsoft.com/office/mac/drawingml/2011/main" xmlns="" val="1"/>
+              <ma14:wrappingTextBoxFlag xmlns="" xmlns:ma14="http://schemas.microsoft.com/office/mac/drawingml/2011/main" val="1"/>
             </a:ext>
           </a:extLst>
         </p:spPr>
@@ -3556,8 +3466,8 @@
         </p:nvSpPr>
         <p:spPr>
           <a:xfrm>
-            <a:off x="3554426" y="7355552"/>
-            <a:ext cx="4860000" cy="1296000"/>
+            <a:off x="3554426" y="7338755"/>
+            <a:ext cx="4860000" cy="1329595"/>
           </a:xfrm>
           <a:prstGeom prst="rect">
             <a:avLst/>
@@ -3573,7 +3483,7 @@
           </a:ln>
           <a:extLst>
             <a:ext uri="{C572A759-6A51-4108-AA02-DFA0A04FC94B}">
-              <ma14:wrappingTextBoxFlag xmlns:ma14="http://schemas.microsoft.com/office/mac/drawingml/2011/main" xmlns="" val="1"/>
+              <ma14:wrappingTextBoxFlag xmlns="" xmlns:ma14="http://schemas.microsoft.com/office/mac/drawingml/2011/main" val="1"/>
             </a:ext>
           </a:extLst>
         </p:spPr>
@@ -3590,13 +3500,22 @@
               <a:defRPr sz="1800"/>
             </a:pPr>
             <a:r>
+              <a:rPr lang="pl-PL" sz="1200" dirty="0" err="1" smtClean="0">
+                <a:latin typeface="Menlo"/>
+                <a:ea typeface="Menlo"/>
+                <a:cs typeface="Menlo"/>
+                <a:sym typeface="Menlo"/>
+              </a:rPr>
+              <a:t>library</a:t>
+            </a:r>
+            <a:r>
               <a:rPr lang="pl-PL" sz="1200" dirty="0" smtClean="0">
                 <a:latin typeface="Menlo"/>
                 <a:ea typeface="Menlo"/>
                 <a:cs typeface="Menlo"/>
                 <a:sym typeface="Menlo"/>
               </a:rPr>
-              <a:t> </a:t>
+              <a:t>(</a:t>
             </a:r>
             <a:r>
               <a:rPr lang="pl-PL" sz="1200" dirty="0" err="1" smtClean="0">
@@ -3605,28 +3524,10 @@
                 <a:cs typeface="Menlo"/>
                 <a:sym typeface="Menlo"/>
               </a:rPr>
-              <a:t>library</a:t>
-            </a:r>
-            <a:r>
-              <a:rPr lang="pl-PL" sz="1200" dirty="0" smtClean="0">
-                <a:latin typeface="Menlo"/>
-                <a:ea typeface="Menlo"/>
-                <a:cs typeface="Menlo"/>
-                <a:sym typeface="Menlo"/>
-              </a:rPr>
-              <a:t>(</a:t>
-            </a:r>
-            <a:r>
-              <a:rPr lang="pl-PL" sz="1200" dirty="0" err="1" smtClean="0">
-                <a:latin typeface="Menlo"/>
-                <a:ea typeface="Menlo"/>
-                <a:cs typeface="Menlo"/>
-                <a:sym typeface="Menlo"/>
-              </a:rPr>
               <a:t>MLExpResso</a:t>
             </a:r>
             <a:r>
-              <a:rPr lang="pl-PL" sz="1200" dirty="0" smtClean="0">
+              <a:rPr lang="pl-PL" sz="1200" dirty="0">
                 <a:latin typeface="Menlo"/>
                 <a:ea typeface="Menlo"/>
                 <a:cs typeface="Menlo"/>
@@ -3643,16 +3544,7 @@
               <a:defRPr sz="1800"/>
             </a:pPr>
             <a:r>
-              <a:rPr lang="pl-PL" sz="1200" dirty="0" smtClean="0">
-                <a:latin typeface="Menlo"/>
-                <a:ea typeface="Menlo"/>
-                <a:cs typeface="Menlo"/>
-                <a:sym typeface="Menlo"/>
-              </a:rPr>
-              <a:t> </a:t>
-            </a:r>
-            <a:r>
-              <a:rPr lang="pl-PL" sz="1200" dirty="0" err="1" smtClean="0">
+              <a:rPr lang="pl-PL" sz="1200" dirty="0" err="1">
                 <a:latin typeface="Menlo"/>
                 <a:ea typeface="Menlo"/>
                 <a:cs typeface="Menlo"/>
@@ -3661,7 +3553,7 @@
               <a:t>library</a:t>
             </a:r>
             <a:r>
-              <a:rPr lang="pl-PL" sz="1200" dirty="0" smtClean="0">
+              <a:rPr lang="pl-PL" sz="1200" dirty="0">
                 <a:latin typeface="Menlo"/>
                 <a:ea typeface="Menlo"/>
                 <a:cs typeface="Menlo"/>
@@ -3670,7 +3562,7 @@
               <a:t>(</a:t>
             </a:r>
             <a:r>
-              <a:rPr lang="pl-PL" sz="1200" dirty="0" err="1" smtClean="0">
+              <a:rPr lang="pl-PL" sz="1200" dirty="0" err="1">
                 <a:latin typeface="Menlo"/>
                 <a:ea typeface="Menlo"/>
                 <a:cs typeface="Menlo"/>
@@ -3679,7 +3571,7 @@
               <a:t>MLExpRessodata</a:t>
             </a:r>
             <a:r>
-              <a:rPr lang="pl-PL" sz="1200" dirty="0" smtClean="0">
+              <a:rPr lang="pl-PL" sz="1200" dirty="0">
                 <a:latin typeface="Menlo"/>
                 <a:ea typeface="Menlo"/>
                 <a:cs typeface="Menlo"/>
@@ -3696,16 +3588,16 @@
               <a:defRPr sz="1800"/>
             </a:pPr>
             <a:r>
-              <a:rPr lang="pl-PL" sz="1200" dirty="0" smtClean="0">
-                <a:latin typeface="Menlo"/>
-                <a:ea typeface="Menlo"/>
-                <a:cs typeface="Menlo"/>
-                <a:sym typeface="Menlo"/>
-              </a:rPr>
-              <a:t> met &lt;- </a:t>
-            </a:r>
-            <a:r>
-              <a:rPr lang="pl-PL" sz="1200" dirty="0" err="1" smtClean="0">
+              <a:rPr lang="pl-PL" sz="1200" dirty="0">
+                <a:latin typeface="Menlo"/>
+                <a:ea typeface="Menlo"/>
+                <a:cs typeface="Menlo"/>
+                <a:sym typeface="Menlo"/>
+              </a:rPr>
+              <a:t>met &lt;- </a:t>
+            </a:r>
+            <a:r>
+              <a:rPr lang="pl-PL" sz="1200" dirty="0" err="1">
                 <a:latin typeface="Menlo"/>
                 <a:ea typeface="Menlo"/>
                 <a:cs typeface="Menlo"/>
@@ -3714,31 +3606,13 @@
               <a:t>aggregate_probes</a:t>
             </a:r>
             <a:r>
-              <a:rPr lang="pl-PL" sz="1200" dirty="0" smtClean="0">
-                <a:latin typeface="Menlo"/>
-                <a:ea typeface="Menlo"/>
-                <a:cs typeface="Menlo"/>
-                <a:sym typeface="Menlo"/>
-              </a:rPr>
-              <a:t>(</a:t>
-            </a:r>
-            <a:r>
               <a:rPr lang="pl-PL" sz="1200" dirty="0">
                 <a:latin typeface="Menlo"/>
                 <a:ea typeface="Menlo"/>
                 <a:cs typeface="Menlo"/>
                 <a:sym typeface="Menlo"/>
               </a:rPr>
-              <a:t>BRCA_methylation_chr17[ ,-1</a:t>
-            </a:r>
-            <a:r>
-              <a:rPr lang="pl-PL" sz="1200" dirty="0" smtClean="0">
-                <a:latin typeface="Menlo"/>
-                <a:ea typeface="Menlo"/>
-                <a:cs typeface="Menlo"/>
-                <a:sym typeface="Menlo"/>
-              </a:rPr>
-              <a:t>])</a:t>
+              <a:t>(BRCA_methylation_chr17)</a:t>
             </a:r>
           </a:p>
           <a:p>
@@ -3749,16 +3623,7 @@
               <a:defRPr sz="1800"/>
             </a:pPr>
             <a:r>
-              <a:rPr lang="pl-PL" sz="1200" dirty="0" smtClean="0">
-                <a:latin typeface="Menlo"/>
-                <a:ea typeface="Menlo"/>
-                <a:cs typeface="Menlo"/>
-                <a:sym typeface="Menlo"/>
-              </a:rPr>
-              <a:t> </a:t>
-            </a:r>
-            <a:r>
-              <a:rPr lang="pl-PL" sz="1200" dirty="0" err="1" smtClean="0">
+              <a:rPr lang="pl-PL" sz="1200" dirty="0" err="1">
                 <a:latin typeface="Menlo"/>
                 <a:ea typeface="Menlo"/>
                 <a:cs typeface="Menlo"/>
@@ -3767,31 +3632,13 @@
               <a:t>gr_met</a:t>
             </a:r>
             <a:r>
-              <a:rPr lang="pl-PL" sz="1200" dirty="0" smtClean="0">
-                <a:latin typeface="Menlo"/>
-                <a:ea typeface="Menlo"/>
-                <a:cs typeface="Menlo"/>
-                <a:sym typeface="Menlo"/>
-              </a:rPr>
-              <a:t> &lt;- BRCA_methylation_chr17</a:t>
-            </a:r>
-            <a:r>
               <a:rPr lang="pl-PL" sz="1200" dirty="0">
                 <a:latin typeface="Menlo"/>
                 <a:ea typeface="Menlo"/>
                 <a:cs typeface="Menlo"/>
                 <a:sym typeface="Menlo"/>
               </a:rPr>
-              <a:t>[ ,-1</a:t>
-            </a:r>
-            <a:r>
-              <a:rPr lang="pl-PL" sz="1200" dirty="0" smtClean="0">
-                <a:latin typeface="Menlo"/>
-                <a:ea typeface="Menlo"/>
-                <a:cs typeface="Menlo"/>
-                <a:sym typeface="Menlo"/>
-              </a:rPr>
-              <a:t>]</a:t>
+              <a:t> &lt;- BRCA_methylation_chr17[ ,1]</a:t>
             </a:r>
           </a:p>
           <a:p>
@@ -3802,16 +3649,7 @@
               <a:defRPr sz="1800"/>
             </a:pPr>
             <a:r>
-              <a:rPr lang="pl-PL" sz="1200" dirty="0" smtClean="0">
-                <a:latin typeface="Menlo"/>
-                <a:ea typeface="Menlo"/>
-                <a:cs typeface="Menlo"/>
-                <a:sym typeface="Menlo"/>
-              </a:rPr>
-              <a:t> </a:t>
-            </a:r>
-            <a:r>
-              <a:rPr lang="pl-PL" sz="1200" dirty="0" err="1" smtClean="0">
+              <a:rPr lang="pl-PL" sz="1200" dirty="0" err="1">
                 <a:latin typeface="Menlo"/>
                 <a:ea typeface="Menlo"/>
                 <a:cs typeface="Menlo"/>
@@ -3820,7 +3658,7 @@
               <a:t>gr_met</a:t>
             </a:r>
             <a:r>
-              <a:rPr lang="pl-PL" sz="1200" dirty="0" smtClean="0">
+              <a:rPr lang="pl-PL" sz="1200" dirty="0">
                 <a:latin typeface="Menlo"/>
                 <a:ea typeface="Menlo"/>
                 <a:cs typeface="Menlo"/>
@@ -3829,7 +3667,7 @@
               <a:t> &lt;- </a:t>
             </a:r>
             <a:r>
-              <a:rPr lang="pl-PL" sz="1200" dirty="0" err="1" smtClean="0">
+              <a:rPr lang="pl-PL" sz="1200" dirty="0" err="1">
                 <a:latin typeface="Menlo"/>
                 <a:ea typeface="Menlo"/>
                 <a:cs typeface="Menlo"/>
@@ -3838,7 +3676,7 @@
               <a:t>ifelse</a:t>
             </a:r>
             <a:r>
-              <a:rPr lang="pl-PL" sz="1200" dirty="0" smtClean="0">
+              <a:rPr lang="pl-PL" sz="1200" dirty="0">
                 <a:latin typeface="Menlo"/>
                 <a:ea typeface="Menlo"/>
                 <a:cs typeface="Menlo"/>
@@ -3847,16 +3685,16 @@
               <a:t>(</a:t>
             </a:r>
             <a:r>
-              <a:rPr lang="pl-PL" sz="1200" dirty="0" err="1" smtClean="0">
-                <a:latin typeface="Menlo"/>
-                <a:ea typeface="Menlo"/>
-                <a:cs typeface="Menlo"/>
-                <a:sym typeface="Menlo"/>
-              </a:rPr>
-              <a:t>group</a:t>
-            </a:r>
-            <a:r>
-              <a:rPr lang="pl-PL" sz="1200" dirty="0" smtClean="0">
+              <a:rPr lang="pl-PL" sz="1200" dirty="0" err="1">
+                <a:latin typeface="Menlo"/>
+                <a:ea typeface="Menlo"/>
+                <a:cs typeface="Menlo"/>
+                <a:sym typeface="Menlo"/>
+              </a:rPr>
+              <a:t>gr_met</a:t>
+            </a:r>
+            <a:r>
+              <a:rPr lang="pl-PL" sz="1200" dirty="0">
                 <a:latin typeface="Menlo"/>
                 <a:ea typeface="Menlo"/>
                 <a:cs typeface="Menlo"/>
@@ -3865,7 +3703,7 @@
               <a:t>=='</a:t>
             </a:r>
             <a:r>
-              <a:rPr lang="pl-PL" sz="1200" dirty="0" err="1" smtClean="0">
+              <a:rPr lang="pl-PL" sz="1200" dirty="0" err="1">
                 <a:latin typeface="Menlo"/>
                 <a:ea typeface="Menlo"/>
                 <a:cs typeface="Menlo"/>
@@ -3880,19 +3718,10 @@
                 <a:cs typeface="Menlo"/>
                 <a:sym typeface="Menlo"/>
               </a:rPr>
-              <a:t>'</a:t>
-            </a:r>
-            <a:r>
-              <a:rPr lang="pl-PL" sz="1200" dirty="0" smtClean="0">
-                <a:latin typeface="Menlo"/>
-                <a:ea typeface="Menlo"/>
-                <a:cs typeface="Menlo"/>
-                <a:sym typeface="Menlo"/>
-              </a:rPr>
-              <a:t>, '</a:t>
-            </a:r>
-            <a:r>
-              <a:rPr lang="pl-PL" sz="1200" dirty="0" err="1" smtClean="0">
+              <a:t>', '</a:t>
+            </a:r>
+            <a:r>
+              <a:rPr lang="pl-PL" sz="1200" dirty="0" err="1">
                 <a:latin typeface="Menlo"/>
                 <a:ea typeface="Menlo"/>
                 <a:cs typeface="Menlo"/>
@@ -3907,19 +3736,10 @@
                 <a:cs typeface="Menlo"/>
                 <a:sym typeface="Menlo"/>
               </a:rPr>
-              <a:t>'</a:t>
-            </a:r>
-            <a:r>
-              <a:rPr lang="pl-PL" sz="1200" dirty="0" smtClean="0">
-                <a:latin typeface="Menlo"/>
-                <a:ea typeface="Menlo"/>
-                <a:cs typeface="Menlo"/>
-                <a:sym typeface="Menlo"/>
-              </a:rPr>
-              <a:t>, '</a:t>
-            </a:r>
-            <a:r>
-              <a:rPr lang="pl-PL" sz="1200" dirty="0" err="1" smtClean="0">
+              <a:t>', '</a:t>
+            </a:r>
+            <a:r>
+              <a:rPr lang="pl-PL" sz="1200" dirty="0" err="1">
                 <a:latin typeface="Menlo"/>
                 <a:ea typeface="Menlo"/>
                 <a:cs typeface="Menlo"/>
@@ -3928,7 +3748,7 @@
               <a:t>other</a:t>
             </a:r>
             <a:r>
-              <a:rPr lang="pl-PL" sz="1200" dirty="0" smtClean="0">
+              <a:rPr lang="pl-PL" sz="1200" dirty="0">
                 <a:latin typeface="Menlo"/>
                 <a:ea typeface="Menlo"/>
                 <a:cs typeface="Menlo"/>
@@ -3945,16 +3765,7 @@
               <a:defRPr sz="1800"/>
             </a:pPr>
             <a:r>
-              <a:rPr lang="pl-PL" sz="1200" dirty="0" smtClean="0">
-                <a:latin typeface="Menlo"/>
-                <a:ea typeface="Menlo"/>
-                <a:cs typeface="Menlo"/>
-                <a:sym typeface="Menlo"/>
-              </a:rPr>
-              <a:t> </a:t>
-            </a:r>
-            <a:r>
-              <a:rPr lang="pl-PL" sz="1200" dirty="0" err="1" smtClean="0">
+              <a:rPr lang="pl-PL" sz="1200" dirty="0" err="1">
                 <a:latin typeface="Menlo"/>
                 <a:ea typeface="Menlo"/>
                 <a:cs typeface="Menlo"/>
@@ -3963,7 +3774,7 @@
               <a:t>res_met</a:t>
             </a:r>
             <a:r>
-              <a:rPr lang="pl-PL" sz="1200" dirty="0" smtClean="0">
+              <a:rPr lang="pl-PL" sz="1200" dirty="0">
                 <a:latin typeface="Menlo"/>
                 <a:ea typeface="Menlo"/>
                 <a:cs typeface="Menlo"/>
@@ -3972,7 +3783,7 @@
               <a:t> &lt;- </a:t>
             </a:r>
             <a:r>
-              <a:rPr lang="pl-PL" sz="1200" dirty="0" err="1" smtClean="0">
+              <a:rPr lang="pl-PL" sz="1200" dirty="0" err="1">
                 <a:latin typeface="Menlo"/>
                 <a:ea typeface="Menlo"/>
                 <a:cs typeface="Menlo"/>
@@ -3981,7 +3792,7 @@
               <a:t>calculate_test</a:t>
             </a:r>
             <a:r>
-              <a:rPr lang="pl-PL" sz="1200" dirty="0" smtClean="0">
+              <a:rPr lang="pl-PL" sz="1200" dirty="0">
                 <a:latin typeface="Menlo"/>
                 <a:ea typeface="Menlo"/>
                 <a:cs typeface="Menlo"/>
@@ -3990,7 +3801,7 @@
               <a:t>(met, </a:t>
             </a:r>
             <a:r>
-              <a:rPr lang="pl-PL" sz="1200" dirty="0" err="1" smtClean="0">
+              <a:rPr lang="pl-PL" sz="1200" dirty="0" err="1">
                 <a:latin typeface="Menlo"/>
                 <a:ea typeface="Menlo"/>
                 <a:cs typeface="Menlo"/>
@@ -3999,7 +3810,7 @@
               <a:t>gr_met</a:t>
             </a:r>
             <a:r>
-              <a:rPr lang="pl-PL" sz="1200" dirty="0" smtClean="0">
+              <a:rPr lang="pl-PL" sz="1200" dirty="0">
                 <a:latin typeface="Menlo"/>
                 <a:ea typeface="Menlo"/>
                 <a:cs typeface="Menlo"/>
@@ -4008,7 +3819,7 @@
               <a:t>, '</a:t>
             </a:r>
             <a:r>
-              <a:rPr lang="pl-PL" sz="1200" dirty="0" err="1" smtClean="0">
+              <a:rPr lang="pl-PL" sz="1200" dirty="0" err="1">
                 <a:latin typeface="Menlo"/>
                 <a:ea typeface="Menlo"/>
                 <a:cs typeface="Menlo"/>
@@ -4017,13 +3828,13 @@
               <a:t>ttest</a:t>
             </a:r>
             <a:r>
-              <a:rPr lang="pl-PL" sz="1200" dirty="0" smtClean="0">
-                <a:latin typeface="Menlo"/>
-                <a:ea typeface="Menlo"/>
-                <a:cs typeface="Menlo"/>
-                <a:sym typeface="Menlo"/>
-              </a:rPr>
-              <a:t>'</a:t>
+              <a:rPr lang="pl-PL" sz="1200" dirty="0">
+                <a:latin typeface="Menlo"/>
+                <a:ea typeface="Menlo"/>
+                <a:cs typeface="Menlo"/>
+                <a:sym typeface="Menlo"/>
+              </a:rPr>
+              <a:t>')</a:t>
             </a:r>
             <a:endParaRPr lang="pl-PL" sz="1200" dirty="0" smtClean="0">
               <a:latin typeface="Menlo"/>
@@ -4077,7 +3888,7 @@
           </a:ln>
           <a:extLst>
             <a:ext uri="{C572A759-6A51-4108-AA02-DFA0A04FC94B}">
-              <ma14:wrappingTextBoxFlag xmlns:ma14="http://schemas.microsoft.com/office/mac/drawingml/2011/main" xmlns="" val="1"/>
+              <ma14:wrappingTextBoxFlag xmlns="" xmlns:ma14="http://schemas.microsoft.com/office/mac/drawingml/2011/main" val="1"/>
             </a:ext>
           </a:extLst>
         </p:spPr>
@@ -4405,7 +4216,7 @@
           </a:ln>
           <a:extLst>
             <a:ext uri="{C572A759-6A51-4108-AA02-DFA0A04FC94B}">
-              <ma14:wrappingTextBoxFlag xmlns:ma14="http://schemas.microsoft.com/office/mac/drawingml/2011/main" xmlns="" val="1"/>
+              <ma14:wrappingTextBoxFlag xmlns="" xmlns:ma14="http://schemas.microsoft.com/office/mac/drawingml/2011/main" val="1"/>
             </a:ext>
           </a:extLst>
         </p:spPr>
@@ -4464,7 +4275,7 @@
           </a:ln>
           <a:extLst>
             <a:ext uri="{C572A759-6A51-4108-AA02-DFA0A04FC94B}">
-              <ma14:wrappingTextBoxFlag xmlns:ma14="http://schemas.microsoft.com/office/mac/drawingml/2011/main" xmlns="" val="1"/>
+              <ma14:wrappingTextBoxFlag xmlns="" xmlns:ma14="http://schemas.microsoft.com/office/mac/drawingml/2011/main" val="1"/>
             </a:ext>
           </a:extLst>
         </p:spPr>
@@ -4542,7 +4353,7 @@
           </a:ln>
           <a:extLst>
             <a:ext uri="{C572A759-6A51-4108-AA02-DFA0A04FC94B}">
-              <ma14:wrappingTextBoxFlag xmlns:ma14="http://schemas.microsoft.com/office/mac/drawingml/2011/main" xmlns="" val="1"/>
+              <ma14:wrappingTextBoxFlag xmlns="" xmlns:ma14="http://schemas.microsoft.com/office/mac/drawingml/2011/main" val="1"/>
             </a:ext>
           </a:extLst>
         </p:spPr>
@@ -4667,7 +4478,7 @@
           </a:ln>
           <a:extLst>
             <a:ext uri="{C572A759-6A51-4108-AA02-DFA0A04FC94B}">
-              <ma14:wrappingTextBoxFlag xmlns:ma14="http://schemas.microsoft.com/office/mac/drawingml/2011/main" xmlns="" val="1"/>
+              <ma14:wrappingTextBoxFlag xmlns="" xmlns:ma14="http://schemas.microsoft.com/office/mac/drawingml/2011/main" val="1"/>
             </a:ext>
           </a:extLst>
         </p:spPr>
@@ -4851,7 +4662,7 @@
           </a:ln>
           <a:extLst>
             <a:ext uri="{C572A759-6A51-4108-AA02-DFA0A04FC94B}">
-              <ma14:wrappingTextBoxFlag xmlns:ma14="http://schemas.microsoft.com/office/mac/drawingml/2011/main" xmlns="" val="1"/>
+              <ma14:wrappingTextBoxFlag xmlns="" xmlns:ma14="http://schemas.microsoft.com/office/mac/drawingml/2011/main" val="1"/>
             </a:ext>
           </a:extLst>
         </p:spPr>
@@ -5297,7 +5108,7 @@
           </a:ln>
           <a:extLst>
             <a:ext uri="{C572A759-6A51-4108-AA02-DFA0A04FC94B}">
-              <ma14:wrappingTextBoxFlag xmlns:ma14="http://schemas.microsoft.com/office/mac/drawingml/2011/main" xmlns="" val="1"/>
+              <ma14:wrappingTextBoxFlag xmlns="" xmlns:ma14="http://schemas.microsoft.com/office/mac/drawingml/2011/main" val="1"/>
             </a:ext>
           </a:extLst>
         </p:spPr>
@@ -5399,7 +5210,7 @@
           </a:ln>
           <a:extLst>
             <a:ext uri="{C572A759-6A51-4108-AA02-DFA0A04FC94B}">
-              <ma14:wrappingTextBoxFlag xmlns:ma14="http://schemas.microsoft.com/office/mac/drawingml/2011/main" xmlns="" val="1"/>
+              <ma14:wrappingTextBoxFlag xmlns="" xmlns:ma14="http://schemas.microsoft.com/office/mac/drawingml/2011/main" val="1"/>
             </a:ext>
           </a:extLst>
         </p:spPr>
@@ -5513,7 +5324,7 @@
           </a:ln>
           <a:extLst>
             <a:ext uri="{C572A759-6A51-4108-AA02-DFA0A04FC94B}">
-              <ma14:wrappingTextBoxFlag xmlns:ma14="http://schemas.microsoft.com/office/mac/drawingml/2011/main" xmlns="" val="1"/>
+              <ma14:wrappingTextBoxFlag xmlns="" xmlns:ma14="http://schemas.microsoft.com/office/mac/drawingml/2011/main" val="1"/>
             </a:ext>
           </a:extLst>
         </p:spPr>
@@ -5567,7 +5378,7 @@
           </a:ln>
           <a:extLst>
             <a:ext uri="{C572A759-6A51-4108-AA02-DFA0A04FC94B}">
-              <ma14:wrappingTextBoxFlag xmlns:ma14="http://schemas.microsoft.com/office/mac/drawingml/2011/main" xmlns="" val="1"/>
+              <ma14:wrappingTextBoxFlag xmlns="" xmlns:ma14="http://schemas.microsoft.com/office/mac/drawingml/2011/main" val="1"/>
             </a:ext>
           </a:extLst>
         </p:spPr>
@@ -5724,12 +5535,6 @@
               </a:rPr>
               <a:t>. </a:t>
             </a:r>
-            <a:endParaRPr lang="en-US" sz="1200" dirty="0">
-              <a:latin typeface="Source Sans Pro Light"/>
-              <a:ea typeface="Source Sans Pro Light"/>
-              <a:cs typeface="Source Sans Pro Light"/>
-              <a:sym typeface="Source Sans Pro Light"/>
-            </a:endParaRPr>
           </a:p>
         </p:txBody>
       </p:sp>
@@ -5758,7 +5563,7 @@
           </a:ln>
           <a:extLst>
             <a:ext uri="{C572A759-6A51-4108-AA02-DFA0A04FC94B}">
-              <ma14:wrappingTextBoxFlag xmlns:ma14="http://schemas.microsoft.com/office/mac/drawingml/2011/main" xmlns="" val="1"/>
+              <ma14:wrappingTextBoxFlag xmlns="" xmlns:ma14="http://schemas.microsoft.com/office/mac/drawingml/2011/main" val="1"/>
             </a:ext>
           </a:extLst>
         </p:spPr>
@@ -5875,7 +5680,7 @@
           </a:ln>
           <a:extLst>
             <a:ext uri="{C572A759-6A51-4108-AA02-DFA0A04FC94B}">
-              <ma14:wrappingTextBoxFlag xmlns:ma14="http://schemas.microsoft.com/office/mac/drawingml/2011/main" xmlns="" val="1"/>
+              <ma14:wrappingTextBoxFlag xmlns="" xmlns:ma14="http://schemas.microsoft.com/office/mac/drawingml/2011/main" val="1"/>
             </a:ext>
           </a:extLst>
         </p:spPr>
@@ -5929,7 +5734,7 @@
           </a:ln>
           <a:extLst>
             <a:ext uri="{C572A759-6A51-4108-AA02-DFA0A04FC94B}">
-              <ma14:wrappingTextBoxFlag xmlns:ma14="http://schemas.microsoft.com/office/mac/drawingml/2011/main" xmlns="" val="1"/>
+              <ma14:wrappingTextBoxFlag xmlns="" xmlns:ma14="http://schemas.microsoft.com/office/mac/drawingml/2011/main" val="1"/>
             </a:ext>
           </a:extLst>
         </p:spPr>
@@ -5973,7 +5778,51 @@
             </a:r>
             <a:r>
               <a:rPr lang="en-US" sz="1200" dirty="0"/>
-              <a:t> data frame column with division in groups.</a:t>
+              <a:t> data frame column with division </a:t>
+            </a:r>
+            <a:r>
+              <a:rPr lang="en-US" sz="1200" dirty="0" smtClean="0"/>
+              <a:t>in</a:t>
+            </a:r>
+            <a:r>
+              <a:rPr lang="pl-PL" sz="1200" dirty="0" smtClean="0"/>
+              <a:t> </a:t>
+            </a:r>
+            <a:r>
+              <a:rPr lang="en-US" sz="1200" dirty="0" smtClean="0"/>
+              <a:t>groups</a:t>
+            </a:r>
+            <a:r>
+              <a:rPr lang="pl-PL" sz="1200" dirty="0" smtClean="0"/>
+              <a:t> (</a:t>
+            </a:r>
+            <a:r>
+              <a:rPr lang="pl-PL" sz="1200" dirty="0" err="1" smtClean="0"/>
+              <a:t>two</a:t>
+            </a:r>
+            <a:r>
+              <a:rPr lang="pl-PL" sz="1200" dirty="0" smtClean="0"/>
+              <a:t> </a:t>
+            </a:r>
+            <a:r>
+              <a:rPr lang="pl-PL" sz="1200" dirty="0" err="1" smtClean="0"/>
+              <a:t>or</a:t>
+            </a:r>
+            <a:r>
+              <a:rPr lang="pl-PL" sz="1200" dirty="0" smtClean="0"/>
+              <a:t> </a:t>
+            </a:r>
+            <a:r>
+              <a:rPr lang="pl-PL" sz="1200" dirty="0" err="1" smtClean="0"/>
+              <a:t>more</a:t>
+            </a:r>
+            <a:r>
+              <a:rPr lang="pl-PL" sz="1200" dirty="0" smtClean="0"/>
+              <a:t>)</a:t>
+            </a:r>
+            <a:r>
+              <a:rPr lang="en-US" sz="1200" dirty="0" smtClean="0"/>
+              <a:t>.</a:t>
             </a:r>
             <a:endParaRPr lang="en-US" sz="1200" dirty="0" smtClean="0">
               <a:latin typeface="Source Sans Pro Light"/>
@@ -6353,7 +6202,7 @@
           </a:ln>
           <a:extLst>
             <a:ext uri="{C572A759-6A51-4108-AA02-DFA0A04FC94B}">
-              <ma14:wrappingTextBoxFlag xmlns:ma14="http://schemas.microsoft.com/office/mac/drawingml/2011/main" xmlns="" val="1"/>
+              <ma14:wrappingTextBoxFlag xmlns="" xmlns:ma14="http://schemas.microsoft.com/office/mac/drawingml/2011/main" val="1"/>
             </a:ext>
           </a:extLst>
         </p:spPr>
@@ -6392,12 +6241,20 @@
               <a:t>() </a:t>
             </a:r>
             <a:r>
-              <a:rPr lang="en-US" sz="1200" dirty="0" err="1"/>
+              <a:rPr lang="en-US" sz="1200" dirty="0" err="1" smtClean="0"/>
               <a:t>visualise</a:t>
             </a:r>
             <a:r>
+              <a:rPr lang="pl-PL" sz="1200" dirty="0" smtClean="0"/>
+              <a:t>s</a:t>
+            </a:r>
+            <a:r>
+              <a:rPr lang="en-US" sz="1200" dirty="0" smtClean="0"/>
+              <a:t> </a:t>
+            </a:r>
+            <a:r>
               <a:rPr lang="en-US" sz="1200" dirty="0"/>
-              <a:t> a chosen gene with marked </a:t>
+              <a:t>a chosen gene with marked </a:t>
             </a:r>
             <a:r>
               <a:rPr lang="en-US" sz="1200" dirty="0" err="1"/>
@@ -6451,7 +6308,7 @@
           </a:ln>
           <a:extLst>
             <a:ext uri="{C572A759-6A51-4108-AA02-DFA0A04FC94B}">
-              <ma14:wrappingTextBoxFlag xmlns:ma14="http://schemas.microsoft.com/office/mac/drawingml/2011/main" xmlns="" val="1"/>
+              <ma14:wrappingTextBoxFlag xmlns="" xmlns:ma14="http://schemas.microsoft.com/office/mac/drawingml/2011/main" val="1"/>
             </a:ext>
           </a:extLst>
         </p:spPr>
@@ -6529,8 +6386,8 @@
         </p:nvSpPr>
         <p:spPr>
           <a:xfrm>
-            <a:off x="8719330" y="7181491"/>
-            <a:ext cx="4824000" cy="422873"/>
+            <a:off x="8719330" y="7181492"/>
+            <a:ext cx="4950000" cy="422873"/>
           </a:xfrm>
           <a:prstGeom prst="rect">
             <a:avLst/>
@@ -6546,7 +6403,7 @@
           </a:ln>
           <a:extLst>
             <a:ext uri="{C572A759-6A51-4108-AA02-DFA0A04FC94B}">
-              <ma14:wrappingTextBoxFlag xmlns:ma14="http://schemas.microsoft.com/office/mac/drawingml/2011/main" xmlns="" val="1"/>
+              <ma14:wrappingTextBoxFlag xmlns="" xmlns:ma14="http://schemas.microsoft.com/office/mac/drawingml/2011/main" val="1"/>
             </a:ext>
           </a:extLst>
         </p:spPr>
@@ -6592,7 +6449,7 @@
                 <a:cs typeface="Menlo"/>
                 <a:sym typeface="Menlo"/>
               </a:rPr>
-              <a:t>(met </a:t>
+              <a:t>(BRCA_methylation_chr17 </a:t>
             </a:r>
             <a:r>
               <a:rPr lang="pl-PL" sz="1200" dirty="0">
@@ -6619,7 +6476,7 @@
                 <a:cs typeface="Menlo"/>
                 <a:sym typeface="Menlo"/>
               </a:rPr>
-              <a:t>,  </a:t>
+              <a:t>,  'CACNA1G</a:t>
             </a:r>
             <a:r>
               <a:rPr lang="pl-PL" sz="1200" dirty="0" smtClean="0">
@@ -6628,7 +6485,7 @@
                 <a:cs typeface="Menlo"/>
                 <a:sym typeface="Menlo"/>
               </a:rPr>
-              <a:t>'CACNA1G'</a:t>
+              <a:t>')</a:t>
             </a:r>
             <a:endParaRPr lang="pl-PL" sz="1200" dirty="0">
               <a:latin typeface="Source Sans Pro"/>
@@ -6648,7 +6505,7 @@
         <p:spPr>
           <a:xfrm>
             <a:off x="8705042" y="7126971"/>
-            <a:ext cx="4872177" cy="260777"/>
+            <a:ext cx="5003161" cy="221947"/>
           </a:xfrm>
           <a:prstGeom prst="roundRect">
             <a:avLst>
@@ -6663,7 +6520,7 @@
           </a:ln>
           <a:extLst>
             <a:ext uri="{C572A759-6A51-4108-AA02-DFA0A04FC94B}">
-              <ma14:wrappingTextBoxFlag xmlns:ma14="http://schemas.microsoft.com/office/mac/drawingml/2011/main" xmlns="" val="1"/>
+              <ma14:wrappingTextBoxFlag xmlns="" xmlns:ma14="http://schemas.microsoft.com/office/mac/drawingml/2011/main" val="1"/>
             </a:ext>
           </a:extLst>
         </p:spPr>
@@ -6717,7 +6574,7 @@
           </a:ln>
           <a:extLst>
             <a:ext uri="{C572A759-6A51-4108-AA02-DFA0A04FC94B}">
-              <ma14:wrappingTextBoxFlag xmlns:ma14="http://schemas.microsoft.com/office/mac/drawingml/2011/main" xmlns="" val="1"/>
+              <ma14:wrappingTextBoxFlag xmlns="" xmlns:ma14="http://schemas.microsoft.com/office/mac/drawingml/2011/main" val="1"/>
             </a:ext>
           </a:extLst>
         </p:spPr>
@@ -6899,7 +6756,7 @@
           </a:ln>
           <a:extLst>
             <a:ext uri="{C572A759-6A51-4108-AA02-DFA0A04FC94B}">
-              <ma14:wrappingTextBoxFlag xmlns:ma14="http://schemas.microsoft.com/office/mac/drawingml/2011/main" xmlns="" val="1"/>
+              <ma14:wrappingTextBoxFlag xmlns="" xmlns:ma14="http://schemas.microsoft.com/office/mac/drawingml/2011/main" val="1"/>
             </a:ext>
           </a:extLst>
         </p:spPr>
@@ -6987,7 +6844,7 @@
           </a:ln>
           <a:extLst>
             <a:ext uri="{C572A759-6A51-4108-AA02-DFA0A04FC94B}">
-              <ma14:wrappingTextBoxFlag xmlns:ma14="http://schemas.microsoft.com/office/mac/drawingml/2011/main" xmlns="" val="1"/>
+              <ma14:wrappingTextBoxFlag xmlns="" xmlns:ma14="http://schemas.microsoft.com/office/mac/drawingml/2011/main" val="1"/>
             </a:ext>
           </a:extLst>
         </p:spPr>
@@ -7057,7 +6914,7 @@
           </a:ln>
           <a:extLst>
             <a:ext uri="{C572A759-6A51-4108-AA02-DFA0A04FC94B}">
-              <ma14:wrappingTextBoxFlag xmlns:ma14="http://schemas.microsoft.com/office/mac/drawingml/2011/main" xmlns="" val="1"/>
+              <ma14:wrappingTextBoxFlag xmlns="" xmlns:ma14="http://schemas.microsoft.com/office/mac/drawingml/2011/main" val="1"/>
             </a:ext>
           </a:extLst>
         </p:spPr>
@@ -7155,7 +7012,7 @@
           </a:ln>
           <a:extLst>
             <a:ext uri="{C572A759-6A51-4108-AA02-DFA0A04FC94B}">
-              <ma14:wrappingTextBoxFlag xmlns:ma14="http://schemas.microsoft.com/office/mac/drawingml/2011/main" xmlns="" val="1"/>
+              <ma14:wrappingTextBoxFlag xmlns="" xmlns:ma14="http://schemas.microsoft.com/office/mac/drawingml/2011/main" val="1"/>
             </a:ext>
           </a:extLst>
         </p:spPr>
@@ -7265,7 +7122,7 @@
           </a:ln>
           <a:extLst>
             <a:ext uri="{C572A759-6A51-4108-AA02-DFA0A04FC94B}">
-              <ma14:wrappingTextBoxFlag xmlns:ma14="http://schemas.microsoft.com/office/mac/drawingml/2011/main" xmlns="" val="1"/>
+              <ma14:wrappingTextBoxFlag xmlns="" xmlns:ma14="http://schemas.microsoft.com/office/mac/drawingml/2011/main" val="1"/>
             </a:ext>
           </a:extLst>
         </p:spPr>
@@ -7385,7 +7242,7 @@
           </a:ln>
           <a:extLst>
             <a:ext uri="{C572A759-6A51-4108-AA02-DFA0A04FC94B}">
-              <ma14:wrappingTextBoxFlag xmlns:ma14="http://schemas.microsoft.com/office/mac/drawingml/2011/main" xmlns="" val="1"/>
+              <ma14:wrappingTextBoxFlag xmlns="" xmlns:ma14="http://schemas.microsoft.com/office/mac/drawingml/2011/main" val="1"/>
             </a:ext>
           </a:extLst>
         </p:spPr>
@@ -7600,7 +7457,7 @@
           </a:ln>
           <a:extLst>
             <a:ext uri="{C572A759-6A51-4108-AA02-DFA0A04FC94B}">
-              <ma14:wrappingTextBoxFlag xmlns:ma14="http://schemas.microsoft.com/office/mac/drawingml/2011/main" xmlns="" val="1"/>
+              <ma14:wrappingTextBoxFlag xmlns="" xmlns:ma14="http://schemas.microsoft.com/office/mac/drawingml/2011/main" val="1"/>
             </a:ext>
           </a:extLst>
         </p:spPr>
@@ -7785,7 +7642,7 @@
           </a:ln>
           <a:extLst>
             <a:ext uri="{C572A759-6A51-4108-AA02-DFA0A04FC94B}">
-              <ma14:wrappingTextBoxFlag xmlns:ma14="http://schemas.microsoft.com/office/mac/drawingml/2011/main" xmlns="" val="1"/>
+              <ma14:wrappingTextBoxFlag xmlns="" xmlns:ma14="http://schemas.microsoft.com/office/mac/drawingml/2011/main" val="1"/>
             </a:ext>
           </a:extLst>
         </p:spPr>
@@ -7951,7 +7808,7 @@
           </a:ln>
           <a:extLst>
             <a:ext uri="{C572A759-6A51-4108-AA02-DFA0A04FC94B}">
-              <ma14:wrappingTextBoxFlag xmlns:ma14="http://schemas.microsoft.com/office/mac/drawingml/2011/main" xmlns="" val="1"/>
+              <ma14:wrappingTextBoxFlag xmlns="" xmlns:ma14="http://schemas.microsoft.com/office/mac/drawingml/2011/main" val="1"/>
             </a:ext>
           </a:extLst>
         </p:spPr>
@@ -8011,7 +7868,7 @@
           </a:ln>
           <a:extLst>
             <a:ext uri="{C572A759-6A51-4108-AA02-DFA0A04FC94B}">
-              <ma14:wrappingTextBoxFlag xmlns:ma14="http://schemas.microsoft.com/office/mac/drawingml/2011/main" xmlns="" val="1"/>
+              <ma14:wrappingTextBoxFlag xmlns="" xmlns:ma14="http://schemas.microsoft.com/office/mac/drawingml/2011/main" val="1"/>
             </a:ext>
           </a:extLst>
         </p:spPr>
@@ -8177,7 +8034,7 @@
           </a:ln>
           <a:extLst>
             <a:ext uri="{C572A759-6A51-4108-AA02-DFA0A04FC94B}">
-              <ma14:wrappingTextBoxFlag xmlns:ma14="http://schemas.microsoft.com/office/mac/drawingml/2011/main" xmlns="" val="1"/>
+              <ma14:wrappingTextBoxFlag xmlns="" xmlns:ma14="http://schemas.microsoft.com/office/mac/drawingml/2011/main" val="1"/>
             </a:ext>
           </a:extLst>
         </p:spPr>
@@ -8231,7 +8088,7 @@
           </a:ln>
           <a:extLst>
             <a:ext uri="{C572A759-6A51-4108-AA02-DFA0A04FC94B}">
-              <ma14:wrappingTextBoxFlag xmlns:ma14="http://schemas.microsoft.com/office/mac/drawingml/2011/main" xmlns="" val="1"/>
+              <ma14:wrappingTextBoxFlag xmlns="" xmlns:ma14="http://schemas.microsoft.com/office/mac/drawingml/2011/main" val="1"/>
             </a:ext>
           </a:extLst>
         </p:spPr>
@@ -8323,7 +8180,7 @@
           </a:ln>
           <a:extLst>
             <a:ext uri="{C572A759-6A51-4108-AA02-DFA0A04FC94B}">
-              <ma14:wrappingTextBoxFlag xmlns:ma14="http://schemas.microsoft.com/office/mac/drawingml/2011/main" xmlns="" val="1"/>
+              <ma14:wrappingTextBoxFlag xmlns="" xmlns:ma14="http://schemas.microsoft.com/office/mac/drawingml/2011/main" val="1"/>
             </a:ext>
           </a:extLst>
         </p:spPr>

</xml_diff>